<commit_message>
Updated slides and handouts
</commit_message>
<xml_diff>
--- a/- Slides/CS301_Bootcamp_Classes_and_Structs.pptx
+++ b/- Slides/CS301_Bootcamp_Classes_and_Structs.pptx
@@ -245,7 +245,7 @@
           <a:p>
             <a:fld id="{4081F25B-69AE-4903-8504-5228045AD135}" type="datetimeFigureOut">
               <a:rPr lang="en-US" smtClean="0"/>
-              <a:t>8/11/2023</a:t>
+              <a:t>8/15/2023</a:t>
             </a:fld>
             <a:endParaRPr lang="en-US"/>
           </a:p>
@@ -856,6 +856,174 @@
 </p:notes>
 </file>
 
+<file path=ppt/notesSlides/notesSlide3.xml><?xml version="1.0" encoding="utf-8"?>
+<p:notes xmlns:a="http://schemas.openxmlformats.org/drawingml/2006/main" xmlns:r="http://schemas.openxmlformats.org/officeDocument/2006/relationships" xmlns:p="http://schemas.openxmlformats.org/presentationml/2006/main">
+  <p:cSld>
+    <p:spTree>
+      <p:nvGrpSpPr>
+        <p:cNvPr id="1" name=""/>
+        <p:cNvGrpSpPr/>
+        <p:nvPr/>
+      </p:nvGrpSpPr>
+      <p:grpSpPr>
+        <a:xfrm>
+          <a:off x="0" y="0"/>
+          <a:ext cx="0" cy="0"/>
+          <a:chOff x="0" y="0"/>
+          <a:chExt cx="0" cy="0"/>
+        </a:xfrm>
+      </p:grpSpPr>
+      <p:sp>
+        <p:nvSpPr>
+          <p:cNvPr id="2" name="Slide Image Placeholder 1"/>
+          <p:cNvSpPr>
+            <a:spLocks noGrp="1" noRot="1" noChangeAspect="1"/>
+          </p:cNvSpPr>
+          <p:nvPr>
+            <p:ph type="sldImg"/>
+          </p:nvPr>
+        </p:nvSpPr>
+        <p:spPr/>
+      </p:sp>
+      <p:sp>
+        <p:nvSpPr>
+          <p:cNvPr id="3" name="Notes Placeholder 2"/>
+          <p:cNvSpPr>
+            <a:spLocks noGrp="1"/>
+          </p:cNvSpPr>
+          <p:nvPr>
+            <p:ph type="body" idx="1"/>
+          </p:nvPr>
+        </p:nvSpPr>
+        <p:spPr/>
+        <p:txBody>
+          <a:bodyPr/>
+          <a:lstStyle/>
+          <a:p>
+            <a:endParaRPr lang="en-US" dirty="0"/>
+          </a:p>
+        </p:txBody>
+      </p:sp>
+      <p:sp>
+        <p:nvSpPr>
+          <p:cNvPr id="4" name="Slide Number Placeholder 3"/>
+          <p:cNvSpPr>
+            <a:spLocks noGrp="1"/>
+          </p:cNvSpPr>
+          <p:nvPr>
+            <p:ph type="sldNum" sz="quarter" idx="5"/>
+          </p:nvPr>
+        </p:nvSpPr>
+        <p:spPr/>
+        <p:txBody>
+          <a:bodyPr/>
+          <a:lstStyle/>
+          <a:p>
+            <a:fld id="{0EA7F0F4-3C26-4460-9542-A08BAE8C602C}" type="slidenum">
+              <a:rPr lang="en-US" smtClean="0"/>
+              <a:t>26</a:t>
+            </a:fld>
+            <a:endParaRPr lang="en-US"/>
+          </a:p>
+        </p:txBody>
+      </p:sp>
+    </p:spTree>
+    <p:extLst>
+      <p:ext uri="{BB962C8B-B14F-4D97-AF65-F5344CB8AC3E}">
+        <p14:creationId xmlns:p14="http://schemas.microsoft.com/office/powerpoint/2010/main" val="2543824354"/>
+      </p:ext>
+    </p:extLst>
+  </p:cSld>
+  <p:clrMapOvr>
+    <a:masterClrMapping/>
+  </p:clrMapOvr>
+</p:notes>
+</file>
+
+<file path=ppt/notesSlides/notesSlide4.xml><?xml version="1.0" encoding="utf-8"?>
+<p:notes xmlns:a="http://schemas.openxmlformats.org/drawingml/2006/main" xmlns:r="http://schemas.openxmlformats.org/officeDocument/2006/relationships" xmlns:p="http://schemas.openxmlformats.org/presentationml/2006/main">
+  <p:cSld>
+    <p:spTree>
+      <p:nvGrpSpPr>
+        <p:cNvPr id="1" name=""/>
+        <p:cNvGrpSpPr/>
+        <p:nvPr/>
+      </p:nvGrpSpPr>
+      <p:grpSpPr>
+        <a:xfrm>
+          <a:off x="0" y="0"/>
+          <a:ext cx="0" cy="0"/>
+          <a:chOff x="0" y="0"/>
+          <a:chExt cx="0" cy="0"/>
+        </a:xfrm>
+      </p:grpSpPr>
+      <p:sp>
+        <p:nvSpPr>
+          <p:cNvPr id="2" name="Slide Image Placeholder 1"/>
+          <p:cNvSpPr>
+            <a:spLocks noGrp="1" noRot="1" noChangeAspect="1"/>
+          </p:cNvSpPr>
+          <p:nvPr>
+            <p:ph type="sldImg"/>
+          </p:nvPr>
+        </p:nvSpPr>
+        <p:spPr/>
+      </p:sp>
+      <p:sp>
+        <p:nvSpPr>
+          <p:cNvPr id="3" name="Notes Placeholder 2"/>
+          <p:cNvSpPr>
+            <a:spLocks noGrp="1"/>
+          </p:cNvSpPr>
+          <p:nvPr>
+            <p:ph type="body" idx="1"/>
+          </p:nvPr>
+        </p:nvSpPr>
+        <p:spPr/>
+        <p:txBody>
+          <a:bodyPr/>
+          <a:lstStyle/>
+          <a:p>
+            <a:endParaRPr lang="en-US" dirty="0"/>
+          </a:p>
+        </p:txBody>
+      </p:sp>
+      <p:sp>
+        <p:nvSpPr>
+          <p:cNvPr id="4" name="Slide Number Placeholder 3"/>
+          <p:cNvSpPr>
+            <a:spLocks noGrp="1"/>
+          </p:cNvSpPr>
+          <p:nvPr>
+            <p:ph type="sldNum" sz="quarter" idx="5"/>
+          </p:nvPr>
+        </p:nvSpPr>
+        <p:spPr/>
+        <p:txBody>
+          <a:bodyPr/>
+          <a:lstStyle/>
+          <a:p>
+            <a:fld id="{0EA7F0F4-3C26-4460-9542-A08BAE8C602C}" type="slidenum">
+              <a:rPr lang="en-US" smtClean="0"/>
+              <a:t>27</a:t>
+            </a:fld>
+            <a:endParaRPr lang="en-US"/>
+          </a:p>
+        </p:txBody>
+      </p:sp>
+    </p:spTree>
+    <p:extLst>
+      <p:ext uri="{BB962C8B-B14F-4D97-AF65-F5344CB8AC3E}">
+        <p14:creationId xmlns:p14="http://schemas.microsoft.com/office/powerpoint/2010/main" val="2689100841"/>
+      </p:ext>
+    </p:extLst>
+  </p:cSld>
+  <p:clrMapOvr>
+    <a:masterClrMapping/>
+  </p:clrMapOvr>
+</p:notes>
+</file>
+
 <file path=ppt/slideLayouts/slideLayout1.xml><?xml version="1.0" encoding="utf-8"?>
 <p:sldLayout xmlns:a="http://schemas.openxmlformats.org/drawingml/2006/main" xmlns:r="http://schemas.openxmlformats.org/officeDocument/2006/relationships" xmlns:p="http://schemas.openxmlformats.org/presentationml/2006/main" type="title" preserve="1">
   <p:cSld name="Title Slide">
@@ -1003,7 +1171,7 @@
           <a:p>
             <a:fld id="{EC5A0E46-DF2F-4CF0-B206-42CD27B775C6}" type="datetimeFigureOut">
               <a:rPr lang="en-US" smtClean="0"/>
-              <a:t>8/11/2023</a:t>
+              <a:t>8/15/2023</a:t>
             </a:fld>
             <a:endParaRPr lang="en-US"/>
           </a:p>
@@ -1237,7 +1405,7 @@
           <a:p>
             <a:fld id="{EC5A0E46-DF2F-4CF0-B206-42CD27B775C6}" type="datetimeFigureOut">
               <a:rPr lang="en-US" smtClean="0"/>
-              <a:t>8/11/2023</a:t>
+              <a:t>8/15/2023</a:t>
             </a:fld>
             <a:endParaRPr lang="en-US"/>
           </a:p>
@@ -1445,7 +1613,7 @@
           <a:p>
             <a:fld id="{EC5A0E46-DF2F-4CF0-B206-42CD27B775C6}" type="datetimeFigureOut">
               <a:rPr lang="en-US" smtClean="0"/>
-              <a:t>8/11/2023</a:t>
+              <a:t>8/15/2023</a:t>
             </a:fld>
             <a:endParaRPr lang="en-US"/>
           </a:p>
@@ -1653,7 +1821,7 @@
           <a:p>
             <a:fld id="{EC5A0E46-DF2F-4CF0-B206-42CD27B775C6}" type="datetimeFigureOut">
               <a:rPr lang="en-US" smtClean="0"/>
-              <a:t>8/11/2023</a:t>
+              <a:t>8/15/2023</a:t>
             </a:fld>
             <a:endParaRPr lang="en-US"/>
           </a:p>
@@ -1928,7 +2096,7 @@
           <a:p>
             <a:fld id="{EC5A0E46-DF2F-4CF0-B206-42CD27B775C6}" type="datetimeFigureOut">
               <a:rPr lang="en-US" smtClean="0"/>
-              <a:t>8/11/2023</a:t>
+              <a:t>8/15/2023</a:t>
             </a:fld>
             <a:endParaRPr lang="en-US"/>
           </a:p>
@@ -2198,7 +2366,7 @@
           <a:p>
             <a:fld id="{EC5A0E46-DF2F-4CF0-B206-42CD27B775C6}" type="datetimeFigureOut">
               <a:rPr lang="en-US" smtClean="0"/>
-              <a:t>8/11/2023</a:t>
+              <a:t>8/15/2023</a:t>
             </a:fld>
             <a:endParaRPr lang="en-US"/>
           </a:p>
@@ -2610,7 +2778,7 @@
           <a:p>
             <a:fld id="{EC5A0E46-DF2F-4CF0-B206-42CD27B775C6}" type="datetimeFigureOut">
               <a:rPr lang="en-US" smtClean="0"/>
-              <a:t>8/11/2023</a:t>
+              <a:t>8/15/2023</a:t>
             </a:fld>
             <a:endParaRPr lang="en-US"/>
           </a:p>
@@ -2751,7 +2919,7 @@
           <a:p>
             <a:fld id="{EC5A0E46-DF2F-4CF0-B206-42CD27B775C6}" type="datetimeFigureOut">
               <a:rPr lang="en-US" smtClean="0"/>
-              <a:t>8/11/2023</a:t>
+              <a:t>8/15/2023</a:t>
             </a:fld>
             <a:endParaRPr lang="en-US"/>
           </a:p>
@@ -2864,7 +3032,7 @@
           <a:p>
             <a:fld id="{EC5A0E46-DF2F-4CF0-B206-42CD27B775C6}" type="datetimeFigureOut">
               <a:rPr lang="en-US" smtClean="0"/>
-              <a:t>8/11/2023</a:t>
+              <a:t>8/15/2023</a:t>
             </a:fld>
             <a:endParaRPr lang="en-US"/>
           </a:p>
@@ -3175,7 +3343,7 @@
           <a:p>
             <a:fld id="{EC5A0E46-DF2F-4CF0-B206-42CD27B775C6}" type="datetimeFigureOut">
               <a:rPr lang="en-US" smtClean="0"/>
-              <a:t>8/11/2023</a:t>
+              <a:t>8/15/2023</a:t>
             </a:fld>
             <a:endParaRPr lang="en-US"/>
           </a:p>
@@ -3463,7 +3631,7 @@
           <a:p>
             <a:fld id="{EC5A0E46-DF2F-4CF0-B206-42CD27B775C6}" type="datetimeFigureOut">
               <a:rPr lang="en-US" smtClean="0"/>
-              <a:t>8/11/2023</a:t>
+              <a:t>8/15/2023</a:t>
             </a:fld>
             <a:endParaRPr lang="en-US"/>
           </a:p>
@@ -3704,7 +3872,7 @@
           <a:p>
             <a:fld id="{EC5A0E46-DF2F-4CF0-B206-42CD27B775C6}" type="datetimeFigureOut">
               <a:rPr lang="en-US" smtClean="0"/>
-              <a:t>8/11/2023</a:t>
+              <a:t>8/15/2023</a:t>
             </a:fld>
             <a:endParaRPr lang="en-US"/>
           </a:p>
@@ -4207,7 +4375,7 @@
 </file>
 
 <file path=ppt/slides/slide10.xml><?xml version="1.0" encoding="utf-8"?>
-<p:sld xmlns:a="http://schemas.openxmlformats.org/drawingml/2006/main" xmlns:r="http://schemas.openxmlformats.org/officeDocument/2006/relationships" xmlns:p="http://schemas.openxmlformats.org/presentationml/2006/main">
+<p:sld xmlns:a="http://schemas.openxmlformats.org/drawingml/2006/main" xmlns:r="http://schemas.openxmlformats.org/officeDocument/2006/relationships" xmlns:p="http://schemas.openxmlformats.org/presentationml/2006/main" show="0">
   <p:cSld>
     <p:spTree>
       <p:nvGrpSpPr>
@@ -4393,7 +4561,7 @@
 </file>
 
 <file path=ppt/slides/slide11.xml><?xml version="1.0" encoding="utf-8"?>
-<p:sld xmlns:a="http://schemas.openxmlformats.org/drawingml/2006/main" xmlns:r="http://schemas.openxmlformats.org/officeDocument/2006/relationships" xmlns:p="http://schemas.openxmlformats.org/presentationml/2006/main">
+<p:sld xmlns:a="http://schemas.openxmlformats.org/drawingml/2006/main" xmlns:r="http://schemas.openxmlformats.org/officeDocument/2006/relationships" xmlns:p="http://schemas.openxmlformats.org/presentationml/2006/main" show="0">
   <p:cSld>
     <p:spTree>
       <p:nvGrpSpPr>
@@ -14603,7 +14771,7 @@
 </file>
 
 <file path=ppt/slides/slide2.xml><?xml version="1.0" encoding="utf-8"?>
-<p:sld xmlns:a="http://schemas.openxmlformats.org/drawingml/2006/main" xmlns:r="http://schemas.openxmlformats.org/officeDocument/2006/relationships" xmlns:p="http://schemas.openxmlformats.org/presentationml/2006/main">
+<p:sld xmlns:a="http://schemas.openxmlformats.org/drawingml/2006/main" xmlns:r="http://schemas.openxmlformats.org/officeDocument/2006/relationships" xmlns:p="http://schemas.openxmlformats.org/presentationml/2006/main" show="0">
   <p:cSld>
     <p:spTree>
       <p:nvGrpSpPr>
@@ -16283,7 +16451,7 @@
           <a:p>
             <a:r>
               <a:rPr lang="en-US" dirty="0"/>
-              <a:t>We have already used some classes before!</a:t>
+              <a:t>You have likely used some classes before!</a:t>
             </a:r>
           </a:p>
         </p:txBody>
@@ -16850,7 +17018,7 @@
         </p:nvSpPr>
         <p:spPr>
           <a:xfrm>
-            <a:off x="1981200" y="4034975"/>
+            <a:off x="1873169" y="4225576"/>
             <a:ext cx="8445658" cy="2091767"/>
           </a:xfrm>
         </p:spPr>
@@ -16870,7 +17038,7 @@
               <a:rPr lang="en-US" altLang="en-US" sz="2000" dirty="0">
                 <a:latin typeface="Consolas" panose="020B0609020204030204" pitchFamily="49" charset="0"/>
               </a:rPr>
-              <a:t>public: </a:t>
+              <a:t>public:  	</a:t>
             </a:r>
             <a:r>
               <a:rPr lang="en-US" altLang="en-US" sz="2000" dirty="0">
@@ -16898,13 +17066,13 @@
               <a:rPr lang="en-US" altLang="en-US" sz="2000" dirty="0">
                 <a:latin typeface="Consolas" panose="020B0609020204030204" pitchFamily="49" charset="0"/>
               </a:rPr>
-              <a:t>private:  </a:t>
+              <a:t>private: 	</a:t>
             </a:r>
             <a:r>
               <a:rPr lang="en-US" altLang="en-US" sz="2000" dirty="0">
                 <a:latin typeface="+mj-lt"/>
               </a:rPr>
-              <a:t>“Members only” - can only be called by or accessed by functions that are members of the class</a:t>
+              <a:t>“Members only” - can only be called by or accessed by 			functions that are members of the class</a:t>
             </a:r>
           </a:p>
           <a:p>
@@ -19063,7 +19231,7 @@
         <p:spPr bwMode="auto">
           <a:xfrm>
             <a:off x="2910624" y="4769922"/>
-            <a:ext cx="6442383" cy="1113890"/>
+            <a:ext cx="6442383" cy="886959"/>
           </a:xfrm>
           <a:prstGeom prst="rect">
             <a:avLst/>
@@ -19329,7 +19497,7 @@
             <a:endParaRPr lang="en-US" sz="2600" dirty="0"/>
           </a:p>
           <a:p>
-            <a:pPr marL="457200" indent="-457200">
+            <a:pPr marL="514350" indent="-514350">
               <a:buFont typeface="+mj-lt"/>
               <a:buAutoNum type="arabicPeriod"/>
             </a:pPr>
@@ -19354,7 +19522,7 @@
             <a:endParaRPr lang="en-US" sz="2600" dirty="0"/>
           </a:p>
           <a:p>
-            <a:pPr marL="457200" indent="-457200">
+            <a:pPr marL="514350" indent="-514350">
               <a:buFont typeface="+mj-lt"/>
               <a:buAutoNum type="arabicPeriod"/>
             </a:pPr>
@@ -19364,24 +19532,28 @@
             </a:r>
           </a:p>
           <a:p>
-            <a:pPr marL="0" indent="0">
-              <a:buNone/>
+            <a:pPr marL="514350" indent="-514350">
+              <a:buFont typeface="+mj-lt"/>
+              <a:buAutoNum type="arabicPeriod"/>
             </a:pPr>
             <a:endParaRPr lang="en-US" sz="2600" dirty="0"/>
           </a:p>
           <a:p>
-            <a:pPr marL="0" indent="0">
-              <a:buNone/>
+            <a:pPr marL="514350" indent="-514350">
+              <a:buFont typeface="+mj-lt"/>
+              <a:buAutoNum type="arabicPeriod"/>
             </a:pPr>
             <a:r>
               <a:rPr lang="en-US" sz="2600" dirty="0"/>
-              <a:t>3. 	Objects are declared just like 	struct variables:</a:t>
-            </a:r>
-          </a:p>
-          <a:p>
-            <a:pPr marL="0" indent="0">
-              <a:buNone/>
-            </a:pPr>
+              <a:t>Objects are declared just like struct variables:</a:t>
+            </a:r>
+            <a:br>
+              <a:rPr lang="en-US" sz="2600" dirty="0"/>
+            </a:br>
+            <a:r>
+              <a:rPr lang="en-US" sz="2600" dirty="0"/>
+              <a:t>	</a:t>
+            </a:r>
             <a:r>
               <a:rPr lang="en-US" sz="2600" dirty="0">
                 <a:solidFill>
@@ -19389,7 +19561,7 @@
                 </a:solidFill>
                 <a:latin typeface="Consolas" panose="020B0609020204030204" pitchFamily="49" charset="0"/>
               </a:rPr>
-              <a:t>	Rectangle</a:t>
+              <a:t>Rectangle</a:t>
             </a:r>
             <a:r>
               <a:rPr lang="en-US" sz="2600" dirty="0">
@@ -19402,18 +19574,20 @@
             </a:r>
           </a:p>
           <a:p>
-            <a:pPr marL="0" indent="0">
-              <a:buNone/>
+            <a:pPr marL="514350" indent="-514350">
+              <a:buFont typeface="+mj-lt"/>
+              <a:buAutoNum type="arabicPeriod"/>
             </a:pPr>
             <a:endParaRPr lang="en-US" sz="2600" dirty="0"/>
           </a:p>
           <a:p>
-            <a:pPr marL="0" indent="0">
-              <a:buNone/>
+            <a:pPr marL="514350" indent="-514350">
+              <a:buFont typeface="+mj-lt"/>
+              <a:buAutoNum type="arabicPeriod"/>
             </a:pPr>
             <a:r>
               <a:rPr lang="en-US" sz="2600" dirty="0"/>
-              <a:t>4. 	You use the dot operator (.) 	to 	call functions and access 	members</a:t>
+              <a:t>You use the dot operator (.) to call functions and access members</a:t>
             </a:r>
           </a:p>
           <a:p>
@@ -19426,6 +19600,12 @@
               </a:buClr>
               <a:buNone/>
             </a:pPr>
+            <a:r>
+              <a:rPr lang="en-US" altLang="en-US" sz="2300" dirty="0">
+                <a:latin typeface="Courier New" panose="02070309020205020404" pitchFamily="49" charset="0"/>
+              </a:rPr>
+              <a:t> </a:t>
+            </a:r>
             <a:r>
               <a:rPr lang="en-US" altLang="en-US" sz="2300" dirty="0" err="1">
                 <a:latin typeface="Courier New" panose="02070309020205020404" pitchFamily="49" charset="0"/>
@@ -32258,7 +32438,7 @@
 </file>
 
 <file path=ppt/slides/slide4.xml><?xml version="1.0" encoding="utf-8"?>
-<p:sld xmlns:a="http://schemas.openxmlformats.org/drawingml/2006/main" xmlns:r="http://schemas.openxmlformats.org/officeDocument/2006/relationships" xmlns:p="http://schemas.openxmlformats.org/presentationml/2006/main">
+<p:sld xmlns:a="http://schemas.openxmlformats.org/drawingml/2006/main" xmlns:r="http://schemas.openxmlformats.org/officeDocument/2006/relationships" xmlns:p="http://schemas.openxmlformats.org/presentationml/2006/main" show="0">
   <p:cSld>
     <p:spTree>
       <p:nvGrpSpPr>
@@ -32644,10 +32824,15 @@
             <p:ph type="title"/>
           </p:nvPr>
         </p:nvSpPr>
-        <p:spPr/>
+        <p:spPr>
+          <a:xfrm>
+            <a:off x="381000" y="225124"/>
+            <a:ext cx="11429999" cy="450246"/>
+          </a:xfrm>
+        </p:spPr>
         <p:txBody>
           <a:bodyPr>
-            <a:normAutofit/>
+            <a:normAutofit fontScale="90000"/>
           </a:bodyPr>
           <a:lstStyle/>
           <a:p>
@@ -37774,7 +37959,7 @@
         <p:spPr>
           <a:xfrm>
             <a:off x="2099734" y="2335072"/>
-            <a:ext cx="8475133" cy="1754326"/>
+            <a:ext cx="8475133" cy="1477328"/>
           </a:xfrm>
           <a:prstGeom prst="rect">
             <a:avLst/>
@@ -37895,14 +38080,6 @@
               </a:rPr>
               <a:t>= 0;</a:t>
             </a:r>
-          </a:p>
-          <a:p>
-            <a:endParaRPr lang="en-US" altLang="en-US" dirty="0">
-              <a:solidFill>
-                <a:srgbClr val="080808"/>
-              </a:solidFill>
-              <a:latin typeface="Consolas" panose="020B0609020204030204" pitchFamily="49" charset="0"/>
-            </a:endParaRPr>
           </a:p>
           <a:p>
             <a:r>
@@ -38114,7 +38291,7 @@
 </file>
 
 <file path=ppt/slides/slide5.xml><?xml version="1.0" encoding="utf-8"?>
-<p:sld xmlns:a="http://schemas.openxmlformats.org/drawingml/2006/main" xmlns:r="http://schemas.openxmlformats.org/officeDocument/2006/relationships" xmlns:p="http://schemas.openxmlformats.org/presentationml/2006/main">
+<p:sld xmlns:a="http://schemas.openxmlformats.org/drawingml/2006/main" xmlns:r="http://schemas.openxmlformats.org/officeDocument/2006/relationships" xmlns:p="http://schemas.openxmlformats.org/presentationml/2006/main" show="0">
   <p:cSld>
     <p:spTree>
       <p:nvGrpSpPr>
@@ -43817,7 +43994,7 @@
                 </a:solidFill>
                 <a:latin typeface="Consolas" panose="020B0609020204030204" pitchFamily="49" charset="0"/>
               </a:rPr>
-              <a:t>//store pet's name</a:t>
+              <a:t>// store pet's name</a:t>
             </a:r>
             <a:endParaRPr lang="en-US" sz="1200" dirty="0">
               <a:solidFill>
@@ -43844,7 +44021,7 @@
                 </a:solidFill>
                 <a:latin typeface="Consolas" panose="020B0609020204030204" pitchFamily="49" charset="0"/>
               </a:rPr>
-              <a:t>//store species</a:t>
+              <a:t>// store species</a:t>
             </a:r>
             <a:endParaRPr lang="en-US" sz="1200" dirty="0">
               <a:solidFill>
@@ -43898,7 +44075,7 @@
                 </a:solidFill>
                 <a:latin typeface="Consolas" panose="020B0609020204030204" pitchFamily="49" charset="0"/>
               </a:rPr>
-              <a:t>//store age in years</a:t>
+              <a:t>// store age in years</a:t>
             </a:r>
             <a:endParaRPr lang="en-US" sz="1200" dirty="0">
               <a:solidFill>
@@ -43934,7 +44111,7 @@
                 </a:solidFill>
                 <a:latin typeface="Consolas" panose="020B0609020204030204" pitchFamily="49" charset="0"/>
               </a:rPr>
-              <a:t>//store gender as 'M' or 'F'</a:t>
+              <a:t>// store gender as 'M' or 'F'</a:t>
             </a:r>
             <a:endParaRPr lang="en-US" sz="1200" dirty="0">
               <a:solidFill>
@@ -43970,7 +44147,7 @@
                 </a:solidFill>
                 <a:latin typeface="Consolas" panose="020B0609020204030204" pitchFamily="49" charset="0"/>
               </a:rPr>
-              <a:t>//store weight in pounds</a:t>
+              <a:t>// store weight in pounds</a:t>
             </a:r>
             <a:endParaRPr lang="en-US" sz="1200" dirty="0">
               <a:solidFill>
@@ -44006,7 +44183,7 @@
                 </a:solidFill>
                 <a:latin typeface="Consolas" panose="020B0609020204030204" pitchFamily="49" charset="0"/>
               </a:rPr>
-              <a:t>//store location in shelter</a:t>
+              <a:t>// store location in shelter</a:t>
             </a:r>
             <a:endParaRPr lang="en-US" sz="1200" dirty="0">
               <a:solidFill>
@@ -44042,7 +44219,7 @@
                 </a:solidFill>
                 <a:latin typeface="Consolas" panose="020B0609020204030204" pitchFamily="49" charset="0"/>
               </a:rPr>
-              <a:t>//true/false whether the pet is healthy</a:t>
+              <a:t>// true/false whether the pet is healthy</a:t>
             </a:r>
             <a:endParaRPr lang="en-US" sz="1200" dirty="0">
               <a:solidFill>
@@ -44078,7 +44255,7 @@
                 </a:solidFill>
                 <a:latin typeface="Consolas" panose="020B0609020204030204" pitchFamily="49" charset="0"/>
               </a:rPr>
-              <a:t>//true/false whether the pet is available</a:t>
+              <a:t>// true/false whether the pet is available</a:t>
             </a:r>
             <a:endParaRPr lang="en-US" sz="1200" dirty="0">
               <a:solidFill>
@@ -44114,7 +44291,7 @@
                 </a:solidFill>
                 <a:latin typeface="Consolas" panose="020B0609020204030204" pitchFamily="49" charset="0"/>
               </a:rPr>
-              <a:t>//adoption fee in dollars</a:t>
+              <a:t>// adoption fee in dollars</a:t>
             </a:r>
             <a:endParaRPr lang="en-US" sz="1200" dirty="0">
               <a:solidFill>
@@ -44947,7 +45124,7 @@
 </file>
 
 <file path=ppt/slides/slide9.xml><?xml version="1.0" encoding="utf-8"?>
-<p:sld xmlns:a="http://schemas.openxmlformats.org/drawingml/2006/main" xmlns:r="http://schemas.openxmlformats.org/officeDocument/2006/relationships" xmlns:p="http://schemas.openxmlformats.org/presentationml/2006/main">
+<p:sld xmlns:a="http://schemas.openxmlformats.org/drawingml/2006/main" xmlns:r="http://schemas.openxmlformats.org/officeDocument/2006/relationships" xmlns:p="http://schemas.openxmlformats.org/presentationml/2006/main" show="0">
   <p:cSld>
     <p:spTree>
       <p:nvGrpSpPr>

</xml_diff>